<commit_message>
Mouse Drag Function Tutorial Renewal
- Using a function called when the
  game object goes out of camera

- Show world space UI on game
  object

- Updated sound tutorial PPT Data

- Adding and deleting resource data
</commit_message>
<xml_diff>
--- a/Assets/Class/Sound/PPT Data/Sound Example.pptx
+++ b/Assets/Class/Sound/PPT Data/Sound Example.pptx
@@ -2,7 +2,7 @@
 <file path=ppt/presentation.xml><?xml version="1.0" encoding="utf-8"?>
 <p:presentation xmlns:a="http://schemas.openxmlformats.org/drawingml/2006/main" xmlns:r="http://schemas.openxmlformats.org/officeDocument/2006/relationships" xmlns:p="http://schemas.openxmlformats.org/presentationml/2006/main" xmlns:p14="http://schemas.microsoft.com/office/powerpoint/2010/main" saveSubsetFonts="1" firstSlideNum="0">
   <p:sldMasterIdLst>
-    <p:sldMasterId id="2147486311" r:id="rId12"/>
+    <p:sldMasterId id="2147486326" r:id="rId12"/>
   </p:sldMasterIdLst>
   <p:notesMasterIdLst>
     <p:notesMasterId r:id="rId14"/>
@@ -10,16 +10,16 @@
   <p:sldIdLst>
     <p:sldId id="287" r:id="rId16"/>
     <p:sldId id="300" r:id="rId17"/>
-    <p:sldId id="312" r:id="rId18"/>
-    <p:sldId id="304" r:id="rId19"/>
-    <p:sldId id="301" r:id="rId20"/>
-    <p:sldId id="302" r:id="rId21"/>
-    <p:sldId id="305" r:id="rId22"/>
-    <p:sldId id="307" r:id="rId23"/>
-    <p:sldId id="308" r:id="rId24"/>
-    <p:sldId id="309" r:id="rId26"/>
-    <p:sldId id="310" r:id="rId28"/>
-    <p:sldId id="311" r:id="rId30"/>
+    <p:sldId id="312" r:id="rId19"/>
+    <p:sldId id="304" r:id="rId21"/>
+    <p:sldId id="301" r:id="rId23"/>
+    <p:sldId id="302" r:id="rId25"/>
+    <p:sldId id="305" r:id="rId26"/>
+    <p:sldId id="307" r:id="rId27"/>
+    <p:sldId id="308" r:id="rId28"/>
+    <p:sldId id="309" r:id="rId29"/>
+    <p:sldId id="310" r:id="rId30"/>
+    <p:sldId id="311" r:id="rId32"/>
   </p:sldIdLst>
   <p:sldSz cx="12192000" cy="6858000"/>
   <p:notesSz cx="6858000" cy="9144000"/>
@@ -7351,8 +7351,8 @@
         </p:nvSpPr>
         <p:spPr>
           <a:xfrm rot="0">
-            <a:off x="6734810" y="2578100"/>
-            <a:ext cx="4223385" cy="1201420"/>
+            <a:off x="6816725" y="2611120"/>
+            <a:ext cx="4142105" cy="1200785"/>
           </a:xfrm>
           <a:prstGeom prst="rect"/>
           <a:noFill/>
@@ -7413,7 +7413,7 @@
         <p:spPr>
           <a:xfrm rot="0">
             <a:off x="6816725" y="5494655"/>
-            <a:ext cx="4152900" cy="647065"/>
+            <a:ext cx="4153535" cy="647065"/>
           </a:xfrm>
           <a:prstGeom prst="rect"/>
           <a:noFill/>
@@ -7496,7 +7496,7 @@
       </p:pic>
       <p:pic>
         <p:nvPicPr>
-          <p:cNvPr id="1194" name="그림 2"/>
+          <p:cNvPr id="1194" name="그림 2" descr="C:/Users/Admin1/AppData/Roaming/PolarisOffice/ETemp/19344_21804320/fImage44751988467.png"/>
           <p:cNvPicPr>
             <a:picLocks noChangeAspect="1"/>
           </p:cNvPicPr>
@@ -7516,8 +7516,8 @@
         </p:blipFill>
         <p:spPr>
           <a:xfrm rot="0">
-            <a:off x="6736080" y="1413510"/>
-            <a:ext cx="1744345" cy="1040130"/>
+            <a:off x="6824980" y="1413510"/>
+            <a:ext cx="1656080" cy="1040765"/>
           </a:xfrm>
           <a:prstGeom prst="roundRect"/>
           <a:solidFill>
@@ -7527,7 +7527,7 @@
       </p:pic>
       <p:pic>
         <p:nvPicPr>
-          <p:cNvPr id="1198" name="그림 48"/>
+          <p:cNvPr id="1198" name="그림 48" descr="C:/Users/Admin1/AppData/Roaming/PolarisOffice/ETemp/19344_21804320/fImage145732189169.png"/>
           <p:cNvPicPr>
             <a:picLocks noChangeAspect="1"/>
           </p:cNvPicPr>
@@ -7547,8 +7547,8 @@
         </p:blipFill>
         <p:spPr>
           <a:xfrm rot="0">
-            <a:off x="6808470" y="3949065"/>
-            <a:ext cx="4149725" cy="1442085"/>
+            <a:off x="6824980" y="3949065"/>
+            <a:ext cx="4123690" cy="1442720"/>
           </a:xfrm>
           <a:prstGeom prst="roundRect"/>
           <a:solidFill>
@@ -8027,17 +8027,17 @@
       </p:pic>
       <p:pic>
         <p:nvPicPr>
-          <p:cNvPr id="1226" name="그림 22"/>
+          <p:cNvPr id="1226" name="그림 22" descr="C:/Users/Admin1/AppData/Roaming/PolarisOffice/ETemp/19344_21804320/fImage146852469358.png"/>
           <p:cNvPicPr>
             <a:picLocks noChangeAspect="1"/>
           </p:cNvPicPr>
           <p:nvPr/>
         </p:nvPicPr>
         <p:blipFill rotWithShape="1">
-          <a:blip r:embed="rId4" cstate="print">
+          <a:blip r:embed="rId4" cstate="hqprint">
             <a:extLst>
               <a:ext uri="{28A0092B-C50C-407E-A947-70E740481C1C}">
-                <a14:useLocalDpi xmlns:a14="http://schemas.microsoft.com/office/drawing/2010/main" val="0"/>
+                <a14:useLocalDpi xmlns:a14="http://schemas.microsoft.com/office/drawing/2010/main"/>
               </a:ext>
             </a:extLst>
           </a:blip>
@@ -8048,7 +8048,7 @@
         <p:spPr>
           <a:xfrm rot="0">
             <a:off x="1172210" y="3616325"/>
-            <a:ext cx="4190365" cy="1047115"/>
+            <a:ext cx="4191000" cy="1047750"/>
           </a:xfrm>
           <a:prstGeom prst="roundRect"/>
           <a:solidFill>
@@ -8910,8 +8910,8 @@
         </p:nvSpPr>
         <p:spPr>
           <a:xfrm rot="0">
-            <a:off x="6845300" y="4281170"/>
-            <a:ext cx="4245610" cy="2031365"/>
+            <a:off x="6816725" y="4297680"/>
+            <a:ext cx="4165600" cy="2031365"/>
           </a:xfrm>
           <a:prstGeom prst="rect"/>
           <a:noFill/>
@@ -9147,17 +9147,17 @@
       </p:sp>
       <p:pic>
         <p:nvPicPr>
-          <p:cNvPr id="1247" name="그림 83"/>
+          <p:cNvPr id="1247" name="그림 9" descr="C:/Users/Admin1/AppData/Roaming/PolarisOffice/ETemp/19344_21804320/fImage353911971478.png"/>
           <p:cNvPicPr>
             <a:picLocks noChangeAspect="1"/>
           </p:cNvPicPr>
           <p:nvPr/>
         </p:nvPicPr>
         <p:blipFill rotWithShape="1">
-          <a:blip r:embed="rId5" cstate="hqprint">
+          <a:blip r:embed="rId7" cstate="print">
             <a:extLst>
               <a:ext uri="{28A0092B-C50C-407E-A947-70E740481C1C}">
-                <a14:useLocalDpi xmlns:a14="http://schemas.microsoft.com/office/drawing/2010/main"/>
+                <a14:useLocalDpi xmlns:a14="http://schemas.microsoft.com/office/drawing/2010/main" val="0"/>
               </a:ext>
             </a:extLst>
           </a:blip>
@@ -9167,11 +9167,13 @@
         </p:blipFill>
         <p:spPr>
           <a:xfrm rot="0">
-            <a:off x="6858000" y="1338580"/>
-            <a:ext cx="4233545" cy="2758440"/>
-          </a:xfrm>
-          <a:prstGeom prst="rect"/>
-          <a:noFill/>
+            <a:off x="6824980" y="1338580"/>
+            <a:ext cx="4149090" cy="2810510"/>
+          </a:xfrm>
+          <a:prstGeom prst="roundRect"/>
+          <a:solidFill>
+            <a:srgbClr val="EDEDED"/>
+          </a:solidFill>
         </p:spPr>
       </p:pic>
     </p:spTree>
@@ -11142,8 +11144,8 @@
         </p:nvSpPr>
         <p:spPr>
           <a:xfrm rot="0">
-            <a:off x="6890385" y="4819015"/>
-            <a:ext cx="4091940" cy="1477645"/>
+            <a:off x="6816725" y="4819015"/>
+            <a:ext cx="4149090" cy="1477645"/>
           </a:xfrm>
           <a:prstGeom prst="rect"/>
           <a:noFill/>
@@ -11180,7 +11182,7 @@
                 <a:latin typeface="맑은 고딕" charset="0"/>
                 <a:ea typeface="맑은 고딕" charset="0"/>
               </a:rPr>
-              <a:t>3</a:t>
+              <a:t>5</a:t>
             </a:r>
             <a:r>
               <a:rPr sz="1800" b="1">
@@ -11204,7 +11206,14 @@
                 <a:latin typeface="맑은 고딕" charset="0"/>
                 <a:ea typeface="맑은 고딕" charset="0"/>
               </a:rPr>
-              <a:t>그다음으로 UI를 선택하고 Slider를 생성합니다.</a:t>
+              <a:t>이제</a:t>
+            </a:r>
+            <a:r>
+              <a:rPr lang="ko-KR" sz="1800">
+                <a:latin typeface="맑은 고딕" charset="0"/>
+                <a:ea typeface="맑은 고딕" charset="0"/>
+              </a:rPr>
+              <a:t> UI를 선택하고 Slider를 생성합니다.</a:t>
             </a:r>
             <a:endParaRPr lang="ko-KR" altLang="en-US" sz="1800">
               <a:latin typeface="맑은 고딕" charset="0"/>
@@ -11323,7 +11332,7 @@
       </p:sp>
       <p:pic>
         <p:nvPicPr>
-          <p:cNvPr id="1196" name="그림 2" descr="C:/Users/Admin1/AppData/Roaming/PolarisOffice/ETemp/20124_21682544/fImage48562109358.png"/>
+          <p:cNvPr id="1196" name="그림 2"/>
           <p:cNvPicPr>
             <a:picLocks noChangeAspect="1"/>
           </p:cNvPicPr>
@@ -11354,7 +11363,7 @@
       </p:pic>
       <p:pic>
         <p:nvPicPr>
-          <p:cNvPr id="1201" name="그림 11" descr="C:/Users/Admin1/AppData/Roaming/PolarisOffice/ETemp/20124_21682544/fImage220051176334.png"/>
+          <p:cNvPr id="1201" name="그림 11" descr="C:/Users/Admin1/AppData/Roaming/PolarisOffice/ETemp/19344_21804320/fImage220051176334.png"/>
           <p:cNvPicPr>
             <a:picLocks noChangeAspect="1"/>
           </p:cNvPicPr>
@@ -11374,8 +11383,8 @@
         </p:blipFill>
         <p:spPr>
           <a:xfrm rot="0">
-            <a:off x="6833235" y="1247140"/>
-            <a:ext cx="2835275" cy="3403600"/>
+            <a:off x="6824980" y="1247140"/>
+            <a:ext cx="2777490" cy="3404235"/>
           </a:xfrm>
           <a:prstGeom prst="roundRect"/>
           <a:solidFill>
@@ -11385,38 +11394,7 @@
       </p:pic>
       <p:pic>
         <p:nvPicPr>
-          <p:cNvPr id="1205" name="그림 29" descr="C:/Users/Admin1/AppData/Roaming/PolarisOffice/ETemp/20124_21682544/fImage52761215724.png"/>
-          <p:cNvPicPr>
-            <a:picLocks noChangeAspect="1"/>
-          </p:cNvPicPr>
-          <p:nvPr/>
-        </p:nvPicPr>
-        <p:blipFill rotWithShape="1">
-          <a:blip r:embed="rId15" cstate="hqprint">
-            <a:extLst>
-              <a:ext uri="{28A0092B-C50C-407E-A947-70E740481C1C}">
-                <a14:useLocalDpi xmlns:a14="http://schemas.microsoft.com/office/drawing/2010/main"/>
-              </a:ext>
-            </a:extLst>
-          </a:blip>
-          <a:stretch>
-            <a:fillRect/>
-          </a:stretch>
-        </p:blipFill>
-        <p:spPr>
-          <a:xfrm rot="0">
-            <a:off x="9809480" y="2018030"/>
-            <a:ext cx="1164590" cy="1879600"/>
-          </a:xfrm>
-          <a:prstGeom prst="roundRect"/>
-          <a:solidFill>
-            <a:srgbClr val="EDEDED"/>
-          </a:solidFill>
-        </p:spPr>
-      </p:pic>
-      <p:pic>
-        <p:nvPicPr>
-          <p:cNvPr id="1206" name="그림 8" descr="C:/Users/Admin1/AppData/Roaming/PolarisOffice/ETemp/20124_21682544/fImage57511976334.png"/>
+          <p:cNvPr id="1206" name="그림 8"/>
           <p:cNvPicPr>
             <a:picLocks noChangeAspect="1"/>
           </p:cNvPicPr>
@@ -11438,6 +11416,174 @@
           <a:xfrm rot="0">
             <a:off x="1238885" y="1238885"/>
             <a:ext cx="1272540" cy="1222375"/>
+          </a:xfrm>
+          <a:prstGeom prst="roundRect"/>
+          <a:solidFill>
+            <a:srgbClr val="EDEDED"/>
+          </a:solidFill>
+        </p:spPr>
+      </p:pic>
+      <p:sp>
+        <p:nvSpPr>
+          <p:cNvPr id="1207" name="텍스트 상자 4"/>
+          <p:cNvSpPr txBox="1">
+            <a:spLocks/>
+          </p:cNvSpPr>
+          <p:nvPr/>
+        </p:nvSpPr>
+        <p:spPr>
+          <a:xfrm rot="0">
+            <a:off x="1236345" y="5090795"/>
+            <a:ext cx="4126865" cy="1200785"/>
+          </a:xfrm>
+          <a:prstGeom prst="rect"/>
+          <a:noFill/>
+          <a:ln w="0">
+            <a:noFill/>
+            <a:prstDash/>
+          </a:ln>
+        </p:spPr>
+        <p:txBody>
+          <a:bodyPr wrap="square" lIns="89535" tIns="46355" rIns="89535" bIns="46355" numCol="1" vert="horz" anchor="t">
+            <a:spAutoFit/>
+          </a:bodyPr>
+          <a:lstStyle/>
+          <a:p>
+            <a:pPr marL="0" indent="0" rtl="0" algn="l" defTabSz="914400" eaLnBrk="1" latinLnBrk="0" hangingPunct="1">
+              <a:buFontTx/>
+              <a:buNone/>
+            </a:pPr>
+            <a:r>
+              <a:rPr sz="1800" b="1">
+                <a:solidFill>
+                  <a:srgbClr val="0611F2"/>
+                </a:solidFill>
+                <a:latin typeface="맑은 고딕" charset="0"/>
+                <a:ea typeface="맑은 고딕" charset="0"/>
+              </a:rPr>
+              <a:t>1</a:t>
+            </a:r>
+            <a:r>
+              <a:rPr lang="ko-KR" sz="1800" b="1">
+                <a:solidFill>
+                  <a:srgbClr val="0611F2"/>
+                </a:solidFill>
+                <a:latin typeface="맑은 고딕" charset="0"/>
+                <a:ea typeface="맑은 고딕" charset="0"/>
+              </a:rPr>
+              <a:t>4.</a:t>
+            </a:r>
+            <a:r>
+              <a:rPr sz="1800">
+                <a:latin typeface="맑은 고딕" charset="0"/>
+                <a:ea typeface="맑은 고딕" charset="0"/>
+              </a:rPr>
+              <a:t> </a:t>
+            </a:r>
+            <a:r>
+              <a:rPr lang="ko-KR" sz="1800">
+                <a:latin typeface="맑은 고딕" charset="0"/>
+                <a:ea typeface="맑은 고딕" charset="0"/>
+              </a:rPr>
+              <a:t>마지막으로 </a:t>
+            </a:r>
+            <a:r>
+              <a:rPr lang="ko-KR" sz="1800">
+                <a:latin typeface="맑은 고딕" charset="0"/>
+                <a:ea typeface="맑은 고딕" charset="0"/>
+              </a:rPr>
+              <a:t>SoundManager 스크립트에서 AudioClip</a:t>
+            </a:r>
+            <a:r>
+              <a:rPr lang="ko-KR" sz="1800">
+                <a:latin typeface="맑은 고딕" charset="0"/>
+                <a:ea typeface="맑은 고딕" charset="0"/>
+              </a:rPr>
+              <a:t> 변수를</a:t>
+            </a:r>
+            <a:r>
+              <a:rPr lang="ko-KR" sz="1800">
+                <a:latin typeface="맑은 고딕" charset="0"/>
+                <a:ea typeface="맑은 고딕" charset="0"/>
+              </a:rPr>
+              <a:t> </a:t>
+            </a:r>
+            <a:r>
+              <a:rPr lang="ko-KR" sz="1800">
+                <a:latin typeface="맑은 고딕" charset="0"/>
+                <a:ea typeface="맑은 고딕" charset="0"/>
+              </a:rPr>
+              <a:t>배열로 선언하고 AudioSource 변수를 2개 선언합니다</a:t>
+            </a:r>
+            <a:r>
+              <a:rPr lang="ko-KR" sz="1800">
+                <a:latin typeface="맑은 고딕" charset="0"/>
+                <a:ea typeface="맑은 고딕" charset="0"/>
+              </a:rPr>
+              <a:t>.</a:t>
+            </a:r>
+            <a:endParaRPr lang="ko-KR" altLang="en-US" sz="1800">
+              <a:latin typeface="맑은 고딕" charset="0"/>
+              <a:ea typeface="맑은 고딕" charset="0"/>
+            </a:endParaRPr>
+          </a:p>
+        </p:txBody>
+      </p:sp>
+      <p:pic>
+        <p:nvPicPr>
+          <p:cNvPr id="1208" name="그림 5" descr="C:/Users/Admin1/AppData/Roaming/PolarisOffice/ETemp/19344_21804320/fImage3254219541.png"/>
+          <p:cNvPicPr>
+            <a:picLocks noChangeAspect="1"/>
+          </p:cNvPicPr>
+          <p:nvPr/>
+        </p:nvPicPr>
+        <p:blipFill rotWithShape="1">
+          <a:blip r:embed="rId17" cstate="print">
+            <a:extLst>
+              <a:ext uri="{28A0092B-C50C-407E-A947-70E740481C1C}">
+                <a14:useLocalDpi xmlns:a14="http://schemas.microsoft.com/office/drawing/2010/main" val="0"/>
+              </a:ext>
+            </a:extLst>
+          </a:blip>
+          <a:stretch>
+            <a:fillRect/>
+          </a:stretch>
+        </p:blipFill>
+        <p:spPr>
+          <a:xfrm rot="0">
+            <a:off x="1230630" y="3604260"/>
+            <a:ext cx="4131945" cy="1433830"/>
+          </a:xfrm>
+          <a:prstGeom prst="roundRect"/>
+          <a:solidFill>
+            <a:srgbClr val="EDEDED"/>
+          </a:solidFill>
+        </p:spPr>
+      </p:pic>
+      <p:pic>
+        <p:nvPicPr>
+          <p:cNvPr id="1209" name="그림 6" descr="C:/Users/Admin1/AppData/Roaming/PolarisOffice/ETemp/19344_21804320/fImage68551968467.png"/>
+          <p:cNvPicPr>
+            <a:picLocks noChangeAspect="1"/>
+          </p:cNvPicPr>
+          <p:nvPr/>
+        </p:nvPicPr>
+        <p:blipFill rotWithShape="1">
+          <a:blip r:embed="rId18" cstate="print">
+            <a:extLst>
+              <a:ext uri="{28A0092B-C50C-407E-A947-70E740481C1C}">
+                <a14:useLocalDpi xmlns:a14="http://schemas.microsoft.com/office/drawing/2010/main" val="0"/>
+              </a:ext>
+            </a:extLst>
+          </a:blip>
+          <a:stretch>
+            <a:fillRect/>
+          </a:stretch>
+        </p:blipFill>
+        <p:spPr>
+          <a:xfrm rot="0">
+            <a:off x="9744710" y="1953895"/>
+            <a:ext cx="1229360" cy="2004060"/>
           </a:xfrm>
           <a:prstGeom prst="roundRect"/>
           <a:solidFill>
@@ -11555,8 +11701,8 @@
         </p:nvSpPr>
         <p:spPr>
           <a:xfrm rot="0">
-            <a:off x="6805295" y="4544060"/>
-            <a:ext cx="4189095" cy="1754505"/>
+            <a:off x="6813550" y="4535805"/>
+            <a:ext cx="4189730" cy="1754505"/>
           </a:xfrm>
           <a:prstGeom prst="rect"/>
           <a:noFill/>
@@ -11593,7 +11739,7 @@
                 <a:latin typeface="맑은 고딕" charset="0"/>
                 <a:ea typeface="맑은 고딕" charset="0"/>
               </a:rPr>
-              <a:t>5</a:t>
+              <a:t>7</a:t>
             </a:r>
             <a:r>
               <a:rPr sz="1800" b="1">
@@ -11617,20 +11763,41 @@
                 <a:latin typeface="맑은 고딕" charset="0"/>
                 <a:ea typeface="맑은 고딕" charset="0"/>
               </a:rPr>
-              <a:t>이제 Project 폴더에서 </a:t>
+              <a:t>그다음으로</a:t>
             </a:r>
             <a:r>
               <a:rPr lang="ko-KR" sz="1800">
                 <a:latin typeface="맑은 고딕" charset="0"/>
                 <a:ea typeface="맑은 고딕" charset="0"/>
               </a:rPr>
-              <a:t>Sound</a:t>
+              <a:t> Project 폴더</a:t>
             </a:r>
             <a:r>
               <a:rPr lang="ko-KR" sz="1800">
                 <a:latin typeface="맑은 고딕" charset="0"/>
                 <a:ea typeface="맑은 고딕" charset="0"/>
               </a:rPr>
+              <a:t> 아래에</a:t>
+            </a:r>
+            <a:r>
+              <a:rPr lang="ko-KR" sz="1800">
+                <a:latin typeface="맑은 고딕" charset="0"/>
+                <a:ea typeface="맑은 고딕" charset="0"/>
+              </a:rPr>
+              <a:t> Sound</a:t>
+            </a:r>
+            <a:r>
+              <a:rPr lang="ko-KR" sz="1800">
+                <a:latin typeface="맑은 고딕" charset="0"/>
+                <a:ea typeface="맑은 고딕" charset="0"/>
+              </a:rPr>
+              <a:t> 폴더</a:t>
+            </a:r>
+            <a:r>
+              <a:rPr lang="ko-KR" sz="1800">
+                <a:latin typeface="맑은 고딕" charset="0"/>
+                <a:ea typeface="맑은 고딕" charset="0"/>
+              </a:rPr>
               <a:t>에 </a:t>
             </a:r>
             <a:r>
@@ -11638,21 +11805,14 @@
                 <a:latin typeface="맑은 고딕" charset="0"/>
                 <a:ea typeface="맑은 고딕" charset="0"/>
               </a:rPr>
-              <a:t>Explosion과 Magic 그리고 Siren 사운드</a:t>
+              <a:t>있는 </a:t>
             </a:r>
             <a:r>
               <a:rPr lang="ko-KR" sz="1800">
                 <a:latin typeface="맑은 고딕" charset="0"/>
                 <a:ea typeface="맑은 고딕" charset="0"/>
               </a:rPr>
-              <a:t>를 선택</a:t>
-            </a:r>
-            <a:r>
-              <a:rPr lang="ko-KR" sz="1800">
-                <a:latin typeface="맑은 고딕" charset="0"/>
-                <a:ea typeface="맑은 고딕" charset="0"/>
-              </a:rPr>
-              <a:t>합니다.</a:t>
+              <a:t>Explosion과 Magic 그리고 Siren 사운드를 선택합니다.</a:t>
             </a:r>
             <a:endParaRPr lang="ko-KR" altLang="en-US" sz="1800">
               <a:latin typeface="맑은 고딕" charset="0"/>
@@ -11679,28 +11839,14 @@
                 <a:latin typeface="맑은 고딕" charset="0"/>
                 <a:ea typeface="맑은 고딕" charset="0"/>
               </a:rPr>
-              <a:t>그리고</a:t>
+              <a:t>그런 다음</a:t>
             </a:r>
             <a:r>
               <a:rPr lang="ko-KR" sz="1800">
                 <a:latin typeface="맑은 고딕" charset="0"/>
                 <a:ea typeface="맑은 고딕" charset="0"/>
               </a:rPr>
-              <a:t> Sound</a:t>
-            </a:r>
-            <a:r>
-              <a:rPr lang="ko-KR" sz="1800">
-                <a:latin typeface="맑은 고딕" charset="0"/>
-                <a:ea typeface="맑은 고딕" charset="0"/>
-              </a:rPr>
-              <a:t> Manager 오브젝트의 배열에 순서대로 넣어줍니다</a:t>
-            </a:r>
-            <a:r>
-              <a:rPr lang="ko-KR" sz="1800">
-                <a:latin typeface="맑은 고딕" charset="0"/>
-                <a:ea typeface="맑은 고딕" charset="0"/>
-              </a:rPr>
-              <a:t>.</a:t>
+              <a:t> Sound Manager 오브젝트의 배열에 순서대로 넣어줍니다.</a:t>
             </a:r>
             <a:endParaRPr lang="ko-KR" altLang="en-US" sz="1800">
               <a:latin typeface="맑은 고딕" charset="0"/>
@@ -11718,9 +11864,9 @@
           <p:nvPr/>
         </p:nvSpPr>
         <p:spPr>
-          <a:xfrm rot="0">
+          <a:xfrm>
             <a:off x="1238885" y="5370830"/>
-            <a:ext cx="4119880" cy="923925"/>
+            <a:ext cx="4120515" cy="923925"/>
           </a:xfrm>
           <a:prstGeom prst="rect"/>
           <a:noFill/>
@@ -11747,17 +11893,7 @@
                 <a:latin typeface="맑은 고딕" charset="0"/>
                 <a:ea typeface="맑은 고딕" charset="0"/>
               </a:rPr>
-              <a:t>1</a:t>
-            </a:r>
-            <a:r>
-              <a:rPr lang="ko-KR" sz="1800" b="1">
-                <a:solidFill>
-                  <a:srgbClr val="0611F2"/>
-                </a:solidFill>
-                <a:latin typeface="맑은 고딕" charset="0"/>
-                <a:ea typeface="맑은 고딕" charset="0"/>
-              </a:rPr>
-              <a:t>4</a:t>
+              <a:t>16</a:t>
             </a:r>
             <a:r>
               <a:rPr sz="1800" b="1">
@@ -11781,7 +11917,21 @@
                 <a:latin typeface="맑은 고딕" charset="0"/>
                 <a:ea typeface="맑은 고딕" charset="0"/>
               </a:rPr>
-              <a:t>그런 다음 Volume 오브젝트의 On Value Changed에 Sound Manager를 선택하여 넣어줍니다.</a:t>
+              <a:t>그</a:t>
+            </a:r>
+            <a:r>
+              <a:rPr lang="ko-KR" sz="1800">
+                <a:latin typeface="맑은 고딕" charset="0"/>
+                <a:ea typeface="맑은 고딕" charset="0"/>
+              </a:rPr>
+              <a:t>러고 나서</a:t>
+            </a:r>
+            <a:r>
+              <a:rPr lang="ko-KR" sz="1800">
+                <a:latin typeface="맑은 고딕" charset="0"/>
+                <a:ea typeface="맑은 고딕" charset="0"/>
+              </a:rPr>
+              <a:t> Volume 오브젝트의 On Value Changed에 Sound Manager를 선택하여 넣어줍니다.</a:t>
             </a:r>
             <a:endParaRPr lang="ko-KR" altLang="en-US" sz="1800">
               <a:latin typeface="맑은 고딕" charset="0"/>
@@ -11792,7 +11942,7 @@
       </p:sp>
       <p:pic>
         <p:nvPicPr>
-          <p:cNvPr id="1206" name="그림 41" descr="C:/Users/Admin1/AppData/Roaming/PolarisOffice/ETemp/20124_21682544/fImage472422101478.png"/>
+          <p:cNvPr id="1206" name="그림 41"/>
           <p:cNvPicPr>
             <a:picLocks noChangeAspect="1"/>
           </p:cNvPicPr>
@@ -11823,17 +11973,17 @@
       </p:pic>
       <p:pic>
         <p:nvPicPr>
-          <p:cNvPr id="1208" name="그림 48"/>
+          <p:cNvPr id="1208" name="그림 48" descr="C:/Users/Admin1/AppData/Roaming/PolarisOffice/ETemp/19344_21804320/fImage213922146962.png"/>
           <p:cNvPicPr>
             <a:picLocks noChangeAspect="1"/>
           </p:cNvPicPr>
           <p:nvPr/>
         </p:nvPicPr>
         <p:blipFill rotWithShape="1">
-          <a:blip r:embed="rId4" cstate="print">
+          <a:blip r:embed="rId4" cstate="hqprint">
             <a:extLst>
               <a:ext uri="{28A0092B-C50C-407E-A947-70E740481C1C}">
-                <a14:useLocalDpi xmlns:a14="http://schemas.microsoft.com/office/drawing/2010/main" val="0"/>
+                <a14:useLocalDpi xmlns:a14="http://schemas.microsoft.com/office/drawing/2010/main"/>
               </a:ext>
             </a:extLst>
           </a:blip>
@@ -11843,8 +11993,8 @@
         </p:blipFill>
         <p:spPr>
           <a:xfrm rot="0">
-            <a:off x="6815455" y="1256030"/>
-            <a:ext cx="4202430" cy="2025015"/>
+            <a:off x="6816725" y="1256030"/>
+            <a:ext cx="4201795" cy="2025650"/>
           </a:xfrm>
           <a:prstGeom prst="roundRect"/>
           <a:solidFill>
@@ -11854,17 +12004,17 @@
       </p:pic>
       <p:pic>
         <p:nvPicPr>
-          <p:cNvPr id="1209" name="그림 51"/>
+          <p:cNvPr id="1209" name="그림 51" descr="C:/Users/Admin1/AppData/Roaming/PolarisOffice/ETemp/19344_21804320/fImage136862154464.png"/>
           <p:cNvPicPr>
             <a:picLocks noChangeAspect="1"/>
           </p:cNvPicPr>
           <p:nvPr/>
         </p:nvPicPr>
         <p:blipFill rotWithShape="1">
-          <a:blip r:embed="rId5" cstate="print">
+          <a:blip r:embed="rId5" cstate="hqprint">
             <a:extLst>
               <a:ext uri="{28A0092B-C50C-407E-A947-70E740481C1C}">
-                <a14:useLocalDpi xmlns:a14="http://schemas.microsoft.com/office/drawing/2010/main" val="0"/>
+                <a14:useLocalDpi xmlns:a14="http://schemas.microsoft.com/office/drawing/2010/main"/>
               </a:ext>
             </a:extLst>
           </a:blip>
@@ -11875,7 +12025,7 @@
         <p:spPr>
           <a:xfrm rot="0">
             <a:off x="6803390" y="3544570"/>
-            <a:ext cx="4203700" cy="996315"/>
+            <a:ext cx="4204335" cy="961390"/>
           </a:xfrm>
           <a:prstGeom prst="roundRect"/>
           <a:solidFill>
@@ -11981,7 +12131,7 @@
       </p:cxnSp>
       <p:pic>
         <p:nvPicPr>
-          <p:cNvPr id="1214" name="그림 11" descr="C:/Users/Admin1/AppData/Roaming/PolarisOffice/ETemp/20124_21682544/fImage74722006500.png"/>
+          <p:cNvPr id="1214" name="그림 11"/>
           <p:cNvPicPr>
             <a:picLocks noChangeAspect="1"/>
           </p:cNvPicPr>
@@ -12144,7 +12294,7 @@
       </p:sp>
       <p:sp>
         <p:nvSpPr>
-          <p:cNvPr id="1198" name="Rect 0"/>
+          <p:cNvPr id="1216" name="Rect 0"/>
           <p:cNvSpPr txBox="1">
             <a:spLocks/>
           </p:cNvSpPr>
@@ -12152,8 +12302,8 @@
         </p:nvSpPr>
         <p:spPr>
           <a:xfrm rot="0">
-            <a:off x="1219835" y="2821940"/>
-            <a:ext cx="4126230" cy="923925"/>
+            <a:off x="6808470" y="3856990"/>
+            <a:ext cx="4140835" cy="2585085"/>
           </a:xfrm>
           <a:prstGeom prst="rect"/>
           <a:noFill/>
@@ -12180,17 +12330,7 @@
                 <a:latin typeface="맑은 고딕" charset="0"/>
                 <a:ea typeface="맑은 고딕" charset="0"/>
               </a:rPr>
-              <a:t>1</a:t>
-            </a:r>
-            <a:r>
-              <a:rPr lang="ko-KR" sz="1800" b="1">
-                <a:solidFill>
-                  <a:srgbClr val="0611F2"/>
-                </a:solidFill>
-                <a:latin typeface="맑은 고딕" charset="0"/>
-                <a:ea typeface="맑은 고딕" charset="0"/>
-              </a:rPr>
-              <a:t>6</a:t>
+              <a:t>20</a:t>
             </a:r>
             <a:r>
               <a:rPr sz="1800" b="1">
@@ -12214,103 +12354,46 @@
                 <a:latin typeface="맑은 고딕" charset="0"/>
                 <a:ea typeface="맑은 고딕" charset="0"/>
               </a:rPr>
-              <a:t>그다음 SoundManager 스크립트에서 AudioClip을 배열로 설정</a:t>
+              <a:t>그런 다음</a:t>
             </a:r>
             <a:r>
               <a:rPr lang="ko-KR" sz="1800">
                 <a:latin typeface="맑은 고딕" charset="0"/>
                 <a:ea typeface="맑은 고딕" charset="0"/>
               </a:rPr>
-              <a:t>합니다.</a:t>
+              <a:t> SoundCall(int) 함수를 선언하고 오디오 소스의 PlayOneShot 함수에 오디오 클립의 인덱</a:t>
+            </a:r>
+            <a:r>
+              <a:rPr lang="ko-KR" sz="1800">
+                <a:latin typeface="맑은 고딕" charset="0"/>
+                <a:ea typeface="맑은 고딕" charset="0"/>
+              </a:rPr>
+              <a:t>스로</a:t>
+            </a:r>
+            <a:r>
+              <a:rPr lang="ko-KR" sz="1800">
+                <a:latin typeface="맑은 고딕" charset="0"/>
+                <a:ea typeface="맑은 고딕" charset="0"/>
+              </a:rPr>
+              <a:t> 매개변수를 </a:t>
+            </a:r>
+            <a:r>
+              <a:rPr lang="ko-KR" sz="1800">
+                <a:latin typeface="맑은 고딕" charset="0"/>
+                <a:ea typeface="맑은 고딕" charset="0"/>
+              </a:rPr>
+              <a:t>넣어줍니다.</a:t>
             </a:r>
             <a:endParaRPr lang="ko-KR" altLang="en-US" sz="1800">
               <a:latin typeface="맑은 고딕" charset="0"/>
               <a:ea typeface="맑은 고딕" charset="0"/>
             </a:endParaRPr>
           </a:p>
-        </p:txBody>
-      </p:sp>
-      <p:sp>
-        <p:nvSpPr>
-          <p:cNvPr id="1216" name="Rect 0"/>
-          <p:cNvSpPr txBox="1">
-            <a:spLocks/>
-          </p:cNvSpPr>
-          <p:nvPr/>
-        </p:nvSpPr>
-        <p:spPr>
-          <a:xfrm rot="0">
-            <a:off x="6819265" y="4139565"/>
-            <a:ext cx="4129405" cy="2308225"/>
-          </a:xfrm>
-          <a:prstGeom prst="rect"/>
-          <a:noFill/>
-          <a:ln w="0">
-            <a:noFill/>
-            <a:prstDash/>
-          </a:ln>
-        </p:spPr>
-        <p:txBody>
-          <a:bodyPr wrap="square" lIns="89535" tIns="46355" rIns="89535" bIns="46355" numCol="1" vert="horz" anchor="t">
-            <a:spAutoFit/>
-          </a:bodyPr>
-          <a:lstStyle/>
           <a:p>
             <a:pPr marL="0" indent="0" rtl="0" algn="l" defTabSz="914400" eaLnBrk="1" latinLnBrk="0" hangingPunct="1">
               <a:buFontTx/>
               <a:buNone/>
             </a:pPr>
-            <a:r>
-              <a:rPr sz="1800" b="1">
-                <a:solidFill>
-                  <a:srgbClr val="0611F2"/>
-                </a:solidFill>
-                <a:latin typeface="맑은 고딕" charset="0"/>
-                <a:ea typeface="맑은 고딕" charset="0"/>
-              </a:rPr>
-              <a:t>1</a:t>
-            </a:r>
-            <a:r>
-              <a:rPr lang="ko-KR" sz="1800" b="1">
-                <a:solidFill>
-                  <a:srgbClr val="0611F2"/>
-                </a:solidFill>
-                <a:latin typeface="맑은 고딕" charset="0"/>
-                <a:ea typeface="맑은 고딕" charset="0"/>
-              </a:rPr>
-              <a:t>7</a:t>
-            </a:r>
-            <a:r>
-              <a:rPr sz="1800" b="1">
-                <a:solidFill>
-                  <a:srgbClr val="0611F2"/>
-                </a:solidFill>
-                <a:latin typeface="맑은 고딕" charset="0"/>
-                <a:ea typeface="맑은 고딕" charset="0"/>
-              </a:rPr>
-              <a:t>.</a:t>
-            </a:r>
-            <a:r>
-              <a:rPr sz="1800">
-                <a:latin typeface="맑은 고딕" charset="0"/>
-                <a:ea typeface="맑은 고딕" charset="0"/>
-              </a:rPr>
-              <a:t> </a:t>
-            </a:r>
-            <a:r>
-              <a:rPr lang="ko-KR" sz="1800">
-                <a:latin typeface="맑은 고딕" charset="0"/>
-                <a:ea typeface="맑은 고딕" charset="0"/>
-              </a:rPr>
-              <a:t>이제 </a:t>
-            </a:r>
-            <a:r>
-              <a:rPr lang="ko-KR" sz="1800">
-                <a:latin typeface="맑은 고딕" charset="0"/>
-                <a:ea typeface="맑은 고딕" charset="0"/>
-              </a:rPr>
-              <a:t>SoundCall(int) 함수를 선언하고 오디오 소스의 PlayOneShot 함수에 오디오 클립의 인덱스에 매개변수를 선언합니다.</a:t>
-            </a:r>
             <a:endParaRPr lang="ko-KR" altLang="en-US" sz="1800">
               <a:latin typeface="맑은 고딕" charset="0"/>
               <a:ea typeface="맑은 고딕" charset="0"/>
@@ -12321,78 +12404,51 @@
               <a:buFontTx/>
               <a:buNone/>
             </a:pPr>
+            <a:r>
+              <a:rPr lang="ko-KR" sz="1800">
+                <a:latin typeface="맑은 고딕" charset="0"/>
+                <a:ea typeface="맑은 고딕" charset="0"/>
+              </a:rPr>
+              <a:t>그리고 </a:t>
+            </a:r>
+            <a:r>
+              <a:rPr lang="ko-KR" sz="1800">
+                <a:latin typeface="맑은 고딕" charset="0"/>
+                <a:ea typeface="맑은 고딕" charset="0"/>
+              </a:rPr>
+              <a:t>Volume(float) 함수를 생성하고 매개변수에 float 변수로 오디오 소스의 볼륨 값</a:t>
+            </a:r>
+            <a:r>
+              <a:rPr lang="ko-KR" sz="1800">
+                <a:latin typeface="맑은 고딕" charset="0"/>
+                <a:ea typeface="맑은 고딕" charset="0"/>
+              </a:rPr>
+              <a:t>이</a:t>
+            </a:r>
+            <a:r>
+              <a:rPr lang="ko-KR" sz="1800">
+                <a:latin typeface="맑은 고딕" charset="0"/>
+                <a:ea typeface="맑은 고딕" charset="0"/>
+              </a:rPr>
+              <a:t> 설정</a:t>
+            </a:r>
+            <a:r>
+              <a:rPr lang="ko-KR" sz="1800">
+                <a:latin typeface="맑은 고딕" charset="0"/>
+                <a:ea typeface="맑은 고딕" charset="0"/>
+              </a:rPr>
+              <a:t>될 수 있도록 선언합니다.</a:t>
+            </a:r>
             <a:endParaRPr lang="ko-KR" altLang="en-US" sz="1800">
               <a:latin typeface="맑은 고딕" charset="0"/>
               <a:ea typeface="맑은 고딕" charset="0"/>
             </a:endParaRPr>
           </a:p>
-          <a:p>
-            <a:pPr marL="0" indent="0" rtl="0" algn="l" defTabSz="914400" eaLnBrk="1" latinLnBrk="0" hangingPunct="1">
-              <a:buFontTx/>
-              <a:buNone/>
-            </a:pPr>
-            <a:r>
-              <a:rPr lang="ko-KR" sz="1800">
-                <a:latin typeface="맑은 고딕" charset="0"/>
-                <a:ea typeface="맑은 고딕" charset="0"/>
-              </a:rPr>
-              <a:t>Volume(</a:t>
-            </a:r>
-            <a:r>
-              <a:rPr lang="ko-KR" sz="1800">
-                <a:latin typeface="맑은 고딕" charset="0"/>
-                <a:ea typeface="맑은 고딕" charset="0"/>
-              </a:rPr>
-              <a:t>float</a:t>
-            </a:r>
-            <a:r>
-              <a:rPr lang="ko-KR" sz="1800">
-                <a:latin typeface="맑은 고딕" charset="0"/>
-                <a:ea typeface="맑은 고딕" charset="0"/>
-              </a:rPr>
-              <a:t>) 함수를 생성하고 매개변수에 float 변수로 오디오 소스의 볼륨 값으로 설정합니다.</a:t>
-            </a:r>
-            <a:endParaRPr lang="ko-KR" altLang="en-US" sz="1800">
-              <a:latin typeface="맑은 고딕" charset="0"/>
-              <a:ea typeface="맑은 고딕" charset="0"/>
-            </a:endParaRPr>
-          </a:p>
         </p:txBody>
       </p:sp>
       <p:pic>
         <p:nvPicPr>
-          <p:cNvPr id="1217" name="그림 28"/>
-          <p:cNvPicPr>
-            <a:picLocks noChangeAspect="1"/>
-          </p:cNvPicPr>
-          <p:nvPr/>
-        </p:nvPicPr>
-        <p:blipFill rotWithShape="1">
-          <a:blip r:embed="rId6" cstate="print">
-            <a:extLst>
-              <a:ext uri="{28A0092B-C50C-407E-A947-70E740481C1C}">
-                <a14:useLocalDpi xmlns:a14="http://schemas.microsoft.com/office/drawing/2010/main" val="0"/>
-              </a:ext>
-            </a:extLst>
-          </a:blip>
-          <a:stretch>
-            <a:fillRect/>
-          </a:stretch>
-        </p:blipFill>
-        <p:spPr>
-          <a:xfrm rot="0">
-            <a:off x="1222375" y="1434465"/>
-            <a:ext cx="4123690" cy="1242695"/>
-          </a:xfrm>
-          <a:prstGeom prst="roundRect"/>
-          <a:solidFill>
-            <a:srgbClr val="EDEDED"/>
-          </a:solidFill>
-        </p:spPr>
-      </p:pic>
-      <p:pic>
-        <p:nvPicPr>
-          <p:cNvPr id="1218" name="그림 38" descr="C:/Users/Admin1/AppData/Roaming/PolarisOffice/ETemp/20124_21682544/fImage278162061478.png"/>
+          <p:cNvPr id="1218" name="그림 38" descr="C:/Users/Admin1/AppData/Roaming/PolarisOffice/ETemp/19344_21804320/fImage278162061478.png"/>
           <p:cNvPicPr>
             <a:picLocks noChangeAspect="1"/>
           </p:cNvPicPr>
@@ -12412,8 +12468,8 @@
         </p:blipFill>
         <p:spPr>
           <a:xfrm rot="0">
-            <a:off x="6816725" y="1430020"/>
-            <a:ext cx="4132580" cy="2544445"/>
+            <a:off x="6816725" y="1355090"/>
+            <a:ext cx="4133215" cy="2336800"/>
           </a:xfrm>
           <a:prstGeom prst="roundRect"/>
           <a:solidFill>
@@ -12421,6 +12477,324 @@
           </a:solidFill>
         </p:spPr>
       </p:pic>
+      <p:pic>
+        <p:nvPicPr>
+          <p:cNvPr id="1219" name="그림 14" descr="C:/Users/Admin1/AppData/Roaming/PolarisOffice/ETemp/19344_21804320/fImage188971996334.png"/>
+          <p:cNvPicPr>
+            <a:picLocks noChangeAspect="1"/>
+          </p:cNvPicPr>
+          <p:nvPr/>
+        </p:nvPicPr>
+        <p:blipFill rotWithShape="1">
+          <a:blip r:embed="rId8" cstate="print">
+            <a:extLst>
+              <a:ext uri="{28A0092B-C50C-407E-A947-70E740481C1C}">
+                <a14:useLocalDpi xmlns:a14="http://schemas.microsoft.com/office/drawing/2010/main" val="0"/>
+              </a:ext>
+            </a:extLst>
+          </a:blip>
+          <a:stretch>
+            <a:fillRect/>
+          </a:stretch>
+        </p:blipFill>
+        <p:spPr>
+          <a:xfrm rot="0">
+            <a:off x="2452370" y="1346835"/>
+            <a:ext cx="2918460" cy="1388745"/>
+          </a:xfrm>
+          <a:prstGeom prst="roundRect"/>
+          <a:solidFill>
+            <a:srgbClr val="EDEDED"/>
+          </a:solidFill>
+        </p:spPr>
+      </p:pic>
+      <p:pic>
+        <p:nvPicPr>
+          <p:cNvPr id="1220" name="그림 17" descr="C:/Users/Admin1/AppData/Roaming/PolarisOffice/ETemp/19344_21804320/fImage67852006500.png"/>
+          <p:cNvPicPr>
+            <a:picLocks noChangeAspect="1"/>
+          </p:cNvPicPr>
+          <p:nvPr/>
+        </p:nvPicPr>
+        <p:blipFill rotWithShape="1">
+          <a:blip r:embed="rId9" cstate="print">
+            <a:extLst>
+              <a:ext uri="{28A0092B-C50C-407E-A947-70E740481C1C}">
+                <a14:useLocalDpi xmlns:a14="http://schemas.microsoft.com/office/drawing/2010/main" val="0"/>
+              </a:ext>
+            </a:extLst>
+          </a:blip>
+          <a:stretch>
+            <a:fillRect/>
+          </a:stretch>
+        </p:blipFill>
+        <p:spPr>
+          <a:xfrm rot="0">
+            <a:off x="1238885" y="1339215"/>
+            <a:ext cx="1130935" cy="1403350"/>
+          </a:xfrm>
+          <a:prstGeom prst="roundRect"/>
+          <a:solidFill>
+            <a:srgbClr val="EDEDED"/>
+          </a:solidFill>
+        </p:spPr>
+      </p:pic>
+      <p:sp>
+        <p:nvSpPr>
+          <p:cNvPr id="1221" name="텍스트 상자 20"/>
+          <p:cNvSpPr txBox="1">
+            <a:spLocks/>
+          </p:cNvSpPr>
+          <p:nvPr/>
+        </p:nvSpPr>
+        <p:spPr>
+          <a:xfrm rot="0">
+            <a:off x="1229995" y="2806700"/>
+            <a:ext cx="4138295" cy="1200785"/>
+          </a:xfrm>
+          <a:prstGeom prst="rect"/>
+          <a:noFill/>
+          <a:ln w="0">
+            <a:noFill/>
+            <a:prstDash/>
+          </a:ln>
+        </p:spPr>
+        <p:txBody>
+          <a:bodyPr wrap="square" lIns="89535" tIns="46355" rIns="89535" bIns="46355" numCol="1" vert="horz" anchor="t">
+            <a:spAutoFit/>
+          </a:bodyPr>
+          <a:lstStyle/>
+          <a:p>
+            <a:pPr marL="0" indent="0" rtl="0" algn="l" defTabSz="914400" eaLnBrk="1" latinLnBrk="0" hangingPunct="1">
+              <a:buFontTx/>
+              <a:buNone/>
+            </a:pPr>
+            <a:r>
+              <a:rPr sz="1800" b="1">
+                <a:solidFill>
+                  <a:srgbClr val="0611F2"/>
+                </a:solidFill>
+                <a:latin typeface="맑은 고딕" charset="0"/>
+                <a:ea typeface="맑은 고딕" charset="0"/>
+              </a:rPr>
+              <a:t>1</a:t>
+            </a:r>
+            <a:r>
+              <a:rPr lang="ko-KR" sz="1800" b="1">
+                <a:solidFill>
+                  <a:srgbClr val="0611F2"/>
+                </a:solidFill>
+                <a:latin typeface="맑은 고딕" charset="0"/>
+                <a:ea typeface="맑은 고딕" charset="0"/>
+              </a:rPr>
+              <a:t>8</a:t>
+            </a:r>
+            <a:r>
+              <a:rPr sz="1800" b="1">
+                <a:solidFill>
+                  <a:srgbClr val="0611F2"/>
+                </a:solidFill>
+                <a:latin typeface="맑은 고딕" charset="0"/>
+                <a:ea typeface="맑은 고딕" charset="0"/>
+              </a:rPr>
+              <a:t>.</a:t>
+            </a:r>
+            <a:r>
+              <a:rPr sz="1800">
+                <a:latin typeface="맑은 고딕" charset="0"/>
+                <a:ea typeface="맑은 고딕" charset="0"/>
+              </a:rPr>
+              <a:t> </a:t>
+            </a:r>
+            <a:r>
+              <a:rPr lang="ko-KR" sz="1800">
+                <a:latin typeface="맑은 고딕" charset="0"/>
+                <a:ea typeface="맑은 고딕" charset="0"/>
+              </a:rPr>
+              <a:t>이제 Sou</a:t>
+            </a:r>
+            <a:r>
+              <a:rPr lang="ko-KR" sz="1800">
+                <a:latin typeface="맑은 고딕" charset="0"/>
+                <a:ea typeface="맑은 고딕" charset="0"/>
+              </a:rPr>
+              <a:t>nd Manager 오브젝트의 AudioSource 변수에 Sound Box 오브젝트와 Sound Manager 오브젝트를 넣어줍니다.</a:t>
+            </a:r>
+            <a:endParaRPr lang="ko-KR" altLang="en-US" sz="1800">
+              <a:latin typeface="맑은 고딕" charset="0"/>
+              <a:ea typeface="맑은 고딕" charset="0"/>
+            </a:endParaRPr>
+          </a:p>
+        </p:txBody>
+      </p:sp>
+      <p:cxnSp>
+        <p:nvCxnSpPr>
+          <p:cNvPr id="1222" name="도형 22"/>
+          <p:cNvCxnSpPr/>
+          <p:nvPr/>
+        </p:nvCxnSpPr>
+        <p:spPr>
+          <a:xfrm rot="0">
+            <a:off x="2103120" y="1936750"/>
+            <a:ext cx="3176270" cy="541020"/>
+          </a:xfrm>
+          <a:prstGeom prst="straightConnector1"/>
+          <a:ln w="6350" cap="flat" cmpd="sng">
+            <a:prstDash/>
+            <a:headEnd type="none" w="med" len="med"/>
+            <a:tailEnd type="triangle" w="med" len="med"/>
+          </a:ln>
+        </p:spPr>
+        <p:style>
+          <a:lnRef idx="1">
+            <a:schemeClr val="accent1"/>
+          </a:lnRef>
+          <a:fillRef idx="0">
+            <a:schemeClr val="accent1"/>
+          </a:fillRef>
+          <a:effectRef idx="0">
+            <a:schemeClr val="accent1"/>
+          </a:effectRef>
+          <a:fontRef idx="minor">
+            <a:schemeClr val="tx1"/>
+          </a:fontRef>
+        </p:style>
+      </p:cxnSp>
+      <p:cxnSp>
+        <p:nvCxnSpPr>
+          <p:cNvPr id="1223" name="도형 23"/>
+          <p:cNvCxnSpPr/>
+          <p:nvPr/>
+        </p:nvCxnSpPr>
+        <p:spPr>
+          <a:xfrm rot="0">
+            <a:off x="2319655" y="2136140"/>
+            <a:ext cx="2951480" cy="474980"/>
+          </a:xfrm>
+          <a:prstGeom prst="straightConnector1"/>
+          <a:ln w="6350" cap="flat" cmpd="sng">
+            <a:prstDash/>
+            <a:headEnd type="none" w="med" len="med"/>
+            <a:tailEnd type="triangle" w="med" len="med"/>
+          </a:ln>
+        </p:spPr>
+        <p:style>
+          <a:lnRef idx="1">
+            <a:schemeClr val="accent1"/>
+          </a:lnRef>
+          <a:fillRef idx="0">
+            <a:schemeClr val="accent1"/>
+          </a:fillRef>
+          <a:effectRef idx="0">
+            <a:schemeClr val="accent1"/>
+          </a:effectRef>
+          <a:fontRef idx="minor">
+            <a:schemeClr val="tx1"/>
+          </a:fontRef>
+        </p:style>
+      </p:cxnSp>
+      <p:pic>
+        <p:nvPicPr>
+          <p:cNvPr id="1224" name="그림 24" descr="C:/Users/Admin1/AppData/Roaming/PolarisOffice/ETemp/19344_21804320/fImage118112059169.png"/>
+          <p:cNvPicPr>
+            <a:picLocks noChangeAspect="1"/>
+          </p:cNvPicPr>
+          <p:nvPr/>
+        </p:nvPicPr>
+        <p:blipFill rotWithShape="1">
+          <a:blip r:embed="rId10" cstate="print">
+            <a:extLst>
+              <a:ext uri="{28A0092B-C50C-407E-A947-70E740481C1C}">
+                <a14:useLocalDpi xmlns:a14="http://schemas.microsoft.com/office/drawing/2010/main" val="0"/>
+              </a:ext>
+            </a:extLst>
+          </a:blip>
+          <a:stretch>
+            <a:fillRect/>
+          </a:stretch>
+        </p:blipFill>
+        <p:spPr>
+          <a:xfrm rot="0">
+            <a:off x="1231265" y="4090670"/>
+            <a:ext cx="4139565" cy="1379855"/>
+          </a:xfrm>
+          <a:prstGeom prst="roundRect"/>
+          <a:solidFill>
+            <a:srgbClr val="EDEDED"/>
+          </a:solidFill>
+        </p:spPr>
+      </p:pic>
+      <p:sp>
+        <p:nvSpPr>
+          <p:cNvPr id="1225" name="텍스트 상자 27"/>
+          <p:cNvSpPr txBox="1">
+            <a:spLocks/>
+          </p:cNvSpPr>
+          <p:nvPr/>
+        </p:nvSpPr>
+        <p:spPr>
+          <a:xfrm rot="0">
+            <a:off x="1243330" y="5529580"/>
+            <a:ext cx="4130040" cy="923925"/>
+          </a:xfrm>
+          <a:prstGeom prst="rect"/>
+          <a:noFill/>
+          <a:ln w="0">
+            <a:noFill/>
+            <a:prstDash/>
+          </a:ln>
+        </p:spPr>
+        <p:txBody>
+          <a:bodyPr wrap="square" lIns="89535" tIns="46355" rIns="89535" bIns="46355" numCol="1" vert="horz" anchor="t">
+            <a:spAutoFit/>
+          </a:bodyPr>
+          <a:lstStyle/>
+          <a:p>
+            <a:pPr marL="0" indent="0" rtl="0" algn="l" defTabSz="914400" eaLnBrk="1" latinLnBrk="0" hangingPunct="1">
+              <a:buFontTx/>
+              <a:buNone/>
+            </a:pPr>
+            <a:r>
+              <a:rPr lang="ko-KR" sz="1800" b="1">
+                <a:solidFill>
+                  <a:srgbClr val="0611F2"/>
+                </a:solidFill>
+                <a:latin typeface="맑은 고딕" charset="0"/>
+                <a:ea typeface="맑은 고딕" charset="0"/>
+              </a:rPr>
+              <a:t>19</a:t>
+            </a:r>
+            <a:r>
+              <a:rPr sz="1800" b="1">
+                <a:solidFill>
+                  <a:srgbClr val="0611F2"/>
+                </a:solidFill>
+                <a:latin typeface="맑은 고딕" charset="0"/>
+                <a:ea typeface="맑은 고딕" charset="0"/>
+              </a:rPr>
+              <a:t>.</a:t>
+            </a:r>
+            <a:r>
+              <a:rPr sz="1800">
+                <a:latin typeface="맑은 고딕" charset="0"/>
+                <a:ea typeface="맑은 고딕" charset="0"/>
+              </a:rPr>
+              <a:t> </a:t>
+            </a:r>
+            <a:r>
+              <a:rPr lang="ko-KR" sz="1800">
+                <a:latin typeface="맑은 고딕" charset="0"/>
+                <a:ea typeface="맑은 고딕" charset="0"/>
+              </a:rPr>
+              <a:t>그러고 나서 Sound Manager 오브젝트의 위치와 회전 값을 초기화합니다.</a:t>
+            </a:r>
+            <a:endParaRPr lang="ko-KR" altLang="en-US" sz="1800">
+              <a:latin typeface="맑은 고딕" charset="0"/>
+              <a:ea typeface="맑은 고딕" charset="0"/>
+            </a:endParaRPr>
+          </a:p>
+        </p:txBody>
+      </p:sp>
     </p:spTree>
   </p:cSld>
   <p:clrMapOvr>
@@ -12531,8 +12905,8 @@
         </p:nvSpPr>
         <p:spPr>
           <a:xfrm rot="0">
-            <a:off x="1212850" y="2642870"/>
-            <a:ext cx="4147820" cy="1477645"/>
+            <a:off x="1212850" y="2693035"/>
+            <a:ext cx="4148455" cy="1200785"/>
           </a:xfrm>
           <a:prstGeom prst="rect"/>
           <a:noFill/>
@@ -12559,17 +12933,7 @@
                 <a:latin typeface="맑은 고딕" charset="0"/>
                 <a:ea typeface="맑은 고딕" charset="0"/>
               </a:rPr>
-              <a:t>1</a:t>
-            </a:r>
-            <a:r>
-              <a:rPr lang="ko-KR" sz="1800" b="1">
-                <a:solidFill>
-                  <a:srgbClr val="0611F2"/>
-                </a:solidFill>
-                <a:latin typeface="맑은 고딕" charset="0"/>
-                <a:ea typeface="맑은 고딕" charset="0"/>
-              </a:rPr>
-              <a:t>8</a:t>
+              <a:t>21</a:t>
             </a:r>
             <a:r>
               <a:rPr sz="1800" b="1">
@@ -12593,55 +12957,84 @@
                 <a:latin typeface="맑은 고딕" charset="0"/>
                 <a:ea typeface="맑은 고딕" charset="0"/>
               </a:rPr>
-              <a:t>그다음 Project 폴더에서 Texture에 Noodle 스프라이트 이미지를 선택합니다.</a:t>
+              <a:t>그다음</a:t>
+            </a:r>
+            <a:r>
+              <a:rPr lang="ko-KR" sz="1800">
+                <a:latin typeface="맑은 고딕" charset="0"/>
+                <a:ea typeface="맑은 고딕" charset="0"/>
+              </a:rPr>
+              <a:t>으로</a:t>
+            </a:r>
+            <a:r>
+              <a:rPr lang="ko-KR" sz="1800">
+                <a:latin typeface="맑은 고딕" charset="0"/>
+                <a:ea typeface="맑은 고딕" charset="0"/>
+              </a:rPr>
+              <a:t> Project 폴더에서 Texture</a:t>
+            </a:r>
+            <a:r>
+              <a:rPr lang="ko-KR" sz="1800">
+                <a:latin typeface="맑은 고딕" charset="0"/>
+                <a:ea typeface="맑은 고딕" charset="0"/>
+              </a:rPr>
+              <a:t> 폴더</a:t>
+            </a:r>
+            <a:r>
+              <a:rPr lang="ko-KR" sz="1800">
+                <a:latin typeface="맑은 고딕" charset="0"/>
+                <a:ea typeface="맑은 고딕" charset="0"/>
+              </a:rPr>
+              <a:t>에 </a:t>
+            </a:r>
+            <a:r>
+              <a:rPr lang="ko-KR" sz="1800">
+                <a:latin typeface="맑은 고딕" charset="0"/>
+                <a:ea typeface="맑은 고딕" charset="0"/>
+              </a:rPr>
+              <a:t>있는 </a:t>
+            </a:r>
+            <a:r>
+              <a:rPr lang="ko-KR" sz="1800">
+                <a:latin typeface="맑은 고딕" charset="0"/>
+                <a:ea typeface="맑은 고딕" charset="0"/>
+              </a:rPr>
+              <a:t>Noodle 스프라이트 이미지를 선택</a:t>
+            </a:r>
+            <a:r>
+              <a:rPr lang="ko-KR" sz="1800">
+                <a:latin typeface="맑은 고딕" charset="0"/>
+                <a:ea typeface="맑은 고딕" charset="0"/>
+              </a:rPr>
+              <a:t>하고</a:t>
+            </a:r>
+            <a:r>
+              <a:rPr lang="ko-KR" sz="1800">
+                <a:latin typeface="맑은 고딕" charset="0"/>
+                <a:ea typeface="맑은 고딕" charset="0"/>
+              </a:rPr>
+              <a:t> Handle 오브젝트에 넣어줍니다.</a:t>
             </a:r>
             <a:endParaRPr lang="ko-KR" altLang="en-US" sz="1800">
               <a:latin typeface="맑은 고딕" charset="0"/>
               <a:ea typeface="맑은 고딕" charset="0"/>
             </a:endParaRPr>
           </a:p>
-          <a:p>
-            <a:pPr marL="0" indent="0" rtl="0" algn="l" defTabSz="914400" eaLnBrk="1" latinLnBrk="0" hangingPunct="1">
-              <a:buFontTx/>
-              <a:buNone/>
-            </a:pPr>
-            <a:endParaRPr lang="ko-KR" altLang="en-US" sz="1800">
-              <a:latin typeface="맑은 고딕" charset="0"/>
-              <a:ea typeface="맑은 고딕" charset="0"/>
-            </a:endParaRPr>
-          </a:p>
-          <a:p>
-            <a:pPr marL="0" indent="0" rtl="0" algn="l" defTabSz="914400" eaLnBrk="1" latinLnBrk="0" hangingPunct="1">
-              <a:buFontTx/>
-              <a:buNone/>
-            </a:pPr>
-            <a:r>
-              <a:rPr lang="ko-KR" sz="1800">
-                <a:latin typeface="맑은 고딕" charset="0"/>
-                <a:ea typeface="맑은 고딕" charset="0"/>
-              </a:rPr>
-              <a:t>그리고 Handle 오브젝트에 넣어줍니다.</a:t>
-            </a:r>
-            <a:endParaRPr lang="ko-KR" altLang="en-US" sz="1800">
-              <a:latin typeface="맑은 고딕" charset="0"/>
-              <a:ea typeface="맑은 고딕" charset="0"/>
-            </a:endParaRPr>
-          </a:p>
         </p:txBody>
       </p:sp>
       <p:pic>
         <p:nvPicPr>
-          <p:cNvPr id="1217" name="그림 1"/>
+          <p:cNvPr id="1218" name="그림 4" descr="C:/Users/Admin1/AppData/Roaming/PolarisOffice/ETemp/19344_21804320/fImage276392248467.png"/>
           <p:cNvPicPr>
             <a:picLocks noChangeAspect="1"/>
           </p:cNvPicPr>
           <p:nvPr/>
         </p:nvPicPr>
         <p:blipFill rotWithShape="1">
-          <a:blip r:embed="rId2" cstate="print">
+          <a:blip r:embed="rId3" cstate="hqprint">
             <a:extLst>
               <a:ext uri="{28A0092B-C50C-407E-A947-70E740481C1C}">
-                <a14:useLocalDpi xmlns:a14="http://schemas.microsoft.com/office/drawing/2010/main" val="0"/>
+                <a14:useLocalDpi xmlns:a14="http://schemas.microsoft.com/office/drawing/2010/main"/>
               </a:ext>
             </a:extLst>
           </a:blip>
@@ -12651,8 +13044,8 @@
         </p:blipFill>
         <p:spPr>
           <a:xfrm rot="0">
-            <a:off x="1213485" y="1271905"/>
-            <a:ext cx="1294130" cy="1207135"/>
+            <a:off x="2648585" y="1271905"/>
+            <a:ext cx="2710815" cy="1322070"/>
           </a:xfrm>
           <a:prstGeom prst="roundRect"/>
           <a:solidFill>
@@ -12662,17 +13055,17 @@
       </p:pic>
       <p:pic>
         <p:nvPicPr>
-          <p:cNvPr id="1218" name="그림 4"/>
+          <p:cNvPr id="1219" name="그림 7" descr="C:/Users/Admin1/AppData/Roaming/PolarisOffice/ETemp/19344_21804320/fImage75182256334.png"/>
           <p:cNvPicPr>
             <a:picLocks noChangeAspect="1"/>
           </p:cNvPicPr>
           <p:nvPr/>
         </p:nvPicPr>
         <p:blipFill rotWithShape="1">
-          <a:blip r:embed="rId3" cstate="print">
+          <a:blip r:embed="rId4" cstate="hqprint">
             <a:extLst>
               <a:ext uri="{28A0092B-C50C-407E-A947-70E740481C1C}">
-                <a14:useLocalDpi xmlns:a14="http://schemas.microsoft.com/office/drawing/2010/main" val="0"/>
+                <a14:useLocalDpi xmlns:a14="http://schemas.microsoft.com/office/drawing/2010/main"/>
               </a:ext>
             </a:extLst>
           </a:blip>
@@ -12682,8 +13075,8 @@
         </p:blipFill>
         <p:spPr>
           <a:xfrm rot="0">
-            <a:off x="2648585" y="1271905"/>
-            <a:ext cx="2710180" cy="1216025"/>
+            <a:off x="1211580" y="4006850"/>
+            <a:ext cx="4137660" cy="1122680"/>
           </a:xfrm>
           <a:prstGeom prst="roundRect"/>
           <a:solidFill>
@@ -12691,37 +13084,6 @@
           </a:solidFill>
         </p:spPr>
       </p:pic>
-      <p:pic>
-        <p:nvPicPr>
-          <p:cNvPr id="1219" name="그림 7"/>
-          <p:cNvPicPr>
-            <a:picLocks noChangeAspect="1"/>
-          </p:cNvPicPr>
-          <p:nvPr/>
-        </p:nvPicPr>
-        <p:blipFill rotWithShape="1">
-          <a:blip r:embed="rId4" cstate="print">
-            <a:extLst>
-              <a:ext uri="{28A0092B-C50C-407E-A947-70E740481C1C}">
-                <a14:useLocalDpi xmlns:a14="http://schemas.microsoft.com/office/drawing/2010/main" val="0"/>
-              </a:ext>
-            </a:extLst>
-          </a:blip>
-          <a:stretch>
-            <a:fillRect/>
-          </a:stretch>
-        </p:blipFill>
-        <p:spPr>
-          <a:xfrm rot="0">
-            <a:off x="1211580" y="4239260"/>
-            <a:ext cx="4137025" cy="906780"/>
-          </a:xfrm>
-          <a:prstGeom prst="roundRect"/>
-          <a:solidFill>
-            <a:srgbClr val="EDEDED"/>
-          </a:solidFill>
-        </p:spPr>
-      </p:pic>
       <p:sp>
         <p:nvSpPr>
           <p:cNvPr id="1220" name="텍스트 상자 10"/>
@@ -12731,9 +13093,9 @@
           <p:nvPr/>
         </p:nvSpPr>
         <p:spPr>
-          <a:xfrm rot="0">
+          <a:xfrm>
             <a:off x="1216025" y="5248910"/>
-            <a:ext cx="4132580" cy="923925"/>
+            <a:ext cx="4133215" cy="923925"/>
           </a:xfrm>
           <a:prstGeom prst="rect"/>
           <a:noFill/>
@@ -12760,17 +13122,7 @@
                 <a:latin typeface="맑은 고딕" charset="0"/>
                 <a:ea typeface="맑은 고딕" charset="0"/>
               </a:rPr>
-              <a:t>1</a:t>
-            </a:r>
-            <a:r>
-              <a:rPr lang="ko-KR" sz="1800" b="1">
-                <a:solidFill>
-                  <a:srgbClr val="0611F2"/>
-                </a:solidFill>
-                <a:latin typeface="맑은 고딕" charset="0"/>
-                <a:ea typeface="맑은 고딕" charset="0"/>
-              </a:rPr>
-              <a:t>9</a:t>
+              <a:t>22</a:t>
             </a:r>
             <a:r>
               <a:rPr sz="1800" b="1">
@@ -12794,35 +13146,7 @@
                 <a:latin typeface="맑은 고딕" charset="0"/>
                 <a:ea typeface="맑은 고딕" charset="0"/>
               </a:rPr>
-              <a:t>이제</a:t>
-            </a:r>
-            <a:r>
-              <a:rPr lang="ko-KR" sz="1800">
-                <a:latin typeface="맑은 고딕" charset="0"/>
-                <a:ea typeface="맑은 고딕" charset="0"/>
-              </a:rPr>
-              <a:t> </a:t>
-            </a:r>
-            <a:r>
-              <a:rPr lang="ko-KR" sz="1800">
-                <a:latin typeface="맑은 고딕" charset="0"/>
-                <a:ea typeface="맑은 고딕" charset="0"/>
-              </a:rPr>
-              <a:t>Volume 오브젝트의 </a:t>
-            </a:r>
-            <a:r>
-              <a:rPr lang="ko-KR" sz="1800">
-                <a:latin typeface="맑은 고딕" charset="0"/>
-                <a:ea typeface="맑은 고딕" charset="0"/>
-              </a:rPr>
-              <a:t>On Value Changed에 </a:t>
-            </a:r>
-            <a:r>
-              <a:rPr lang="ko-KR" sz="1800">
-                <a:latin typeface="맑은 고딕" charset="0"/>
-                <a:ea typeface="맑은 고딕" charset="0"/>
-              </a:rPr>
-              <a:t>VolumeControl( ) 함수를 설정합니다. </a:t>
+              <a:t>이제 Volume 오브젝트의 On Value Changed에 VolumeControl( ) 함수를 설정합니다. </a:t>
             </a:r>
             <a:endParaRPr lang="ko-KR" altLang="en-US" sz="1800">
               <a:latin typeface="맑은 고딕" charset="0"/>
@@ -12902,9 +13226,9 @@
           <p:nvPr/>
         </p:nvSpPr>
         <p:spPr>
-          <a:xfrm rot="0">
+          <a:xfrm>
             <a:off x="6837680" y="4119880"/>
-            <a:ext cx="4147820" cy="2031365"/>
+            <a:ext cx="4148455" cy="2031365"/>
           </a:xfrm>
           <a:prstGeom prst="rect"/>
           <a:noFill/>
@@ -12931,7 +13255,7 @@
                 <a:latin typeface="맑은 고딕" charset="0"/>
                 <a:ea typeface="맑은 고딕" charset="0"/>
               </a:rPr>
-              <a:t>20</a:t>
+              <a:t>23</a:t>
             </a:r>
             <a:r>
               <a:rPr sz="1800" b="1">
@@ -12991,6 +13315,37 @@
           </a:p>
         </p:txBody>
       </p:sp>
+      <p:pic>
+        <p:nvPicPr>
+          <p:cNvPr id="1224" name="그림 28" descr="C:/Users/Admin1/AppData/Roaming/PolarisOffice/ETemp/19344_21804320/fImage95762075724.png"/>
+          <p:cNvPicPr>
+            <a:picLocks noChangeAspect="1"/>
+          </p:cNvPicPr>
+          <p:nvPr/>
+        </p:nvPicPr>
+        <p:blipFill rotWithShape="1">
+          <a:blip r:embed="rId8" cstate="print">
+            <a:extLst>
+              <a:ext uri="{28A0092B-C50C-407E-A947-70E740481C1C}">
+                <a14:useLocalDpi xmlns:a14="http://schemas.microsoft.com/office/drawing/2010/main" val="0"/>
+              </a:ext>
+            </a:extLst>
+          </a:blip>
+          <a:stretch>
+            <a:fillRect/>
+          </a:stretch>
+        </p:blipFill>
+        <p:spPr>
+          <a:xfrm rot="0">
+            <a:off x="1214120" y="1278890"/>
+            <a:ext cx="1280795" cy="1315085"/>
+          </a:xfrm>
+          <a:prstGeom prst="roundRect"/>
+          <a:solidFill>
+            <a:srgbClr val="EDEDED"/>
+          </a:solidFill>
+        </p:spPr>
+      </p:pic>
     </p:spTree>
   </p:cSld>
   <p:clrMapOvr>

</xml_diff>

<commit_message>
Updated Navigation Mesh Tutorial Data
- Updating each PPT Data

- Delete resource data
</commit_message>
<xml_diff>
--- a/Assets/Class/Sound/PPT Data/Sound Example.pptx
+++ b/Assets/Class/Sound/PPT Data/Sound Example.pptx
@@ -2,7 +2,7 @@
 <file path=ppt/presentation.xml><?xml version="1.0" encoding="utf-8"?>
 <p:presentation xmlns:a="http://schemas.openxmlformats.org/drawingml/2006/main" xmlns:r="http://schemas.openxmlformats.org/officeDocument/2006/relationships" xmlns:p="http://schemas.openxmlformats.org/presentationml/2006/main" xmlns:p14="http://schemas.microsoft.com/office/powerpoint/2010/main" saveSubsetFonts="1" firstSlideNum="0">
   <p:sldMasterIdLst>
-    <p:sldMasterId id="2147486364" r:id="rId12"/>
+    <p:sldMasterId id="2147486366" r:id="rId12"/>
   </p:sldMasterIdLst>
   <p:notesMasterIdLst>
     <p:notesMasterId r:id="rId14"/>
@@ -15,15 +15,15 @@
     <p:sldId id="301" r:id="rId24"/>
     <p:sldId id="302" r:id="rId26"/>
     <p:sldId id="305" r:id="rId28"/>
-    <p:sldId id="307" r:id="rId29"/>
-    <p:sldId id="308" r:id="rId30"/>
-    <p:sldId id="309" r:id="rId32"/>
-    <p:sldId id="313" r:id="rId34"/>
-    <p:sldId id="310" r:id="rId36"/>
-    <p:sldId id="314" r:id="rId38"/>
-    <p:sldId id="311" r:id="rId39"/>
-    <p:sldId id="315" r:id="rId41"/>
-    <p:sldId id="316" r:id="rId43"/>
+    <p:sldId id="307" r:id="rId30"/>
+    <p:sldId id="308" r:id="rId32"/>
+    <p:sldId id="309" r:id="rId34"/>
+    <p:sldId id="313" r:id="rId36"/>
+    <p:sldId id="310" r:id="rId38"/>
+    <p:sldId id="314" r:id="rId40"/>
+    <p:sldId id="311" r:id="rId41"/>
+    <p:sldId id="315" r:id="rId43"/>
+    <p:sldId id="316" r:id="rId45"/>
   </p:sldIdLst>
   <p:sldSz cx="12192000" cy="6858000"/>
   <p:notesSz cx="6858000" cy="9144000"/>
@@ -10261,37 +10261,6 @@
           </a:solidFill>
         </p:spPr>
       </p:pic>
-      <p:pic>
-        <p:nvPicPr>
-          <p:cNvPr id="1241" name="그림 9"/>
-          <p:cNvPicPr>
-            <a:picLocks noChangeAspect="1"/>
-          </p:cNvPicPr>
-          <p:nvPr/>
-        </p:nvPicPr>
-        <p:blipFill rotWithShape="1">
-          <a:blip r:embed="rId4" cstate="hqprint">
-            <a:extLst>
-              <a:ext uri="{28A0092B-C50C-407E-A947-70E740481C1C}">
-                <a14:useLocalDpi xmlns:a14="http://schemas.microsoft.com/office/drawing/2010/main"/>
-              </a:ext>
-            </a:extLst>
-          </a:blip>
-          <a:stretch>
-            <a:fillRect/>
-          </a:stretch>
-        </p:blipFill>
-        <p:spPr>
-          <a:xfrm rot="0">
-            <a:off x="6816725" y="1221740"/>
-            <a:ext cx="4149090" cy="1223010"/>
-          </a:xfrm>
-          <a:prstGeom prst="roundRect"/>
-          <a:solidFill>
-            <a:srgbClr val="EDEDED"/>
-          </a:solidFill>
-        </p:spPr>
-      </p:pic>
       <p:sp>
         <p:nvSpPr>
           <p:cNvPr id="1242" name="텍스트 상자 10"/>
@@ -10301,9 +10270,9 @@
           <p:nvPr/>
         </p:nvSpPr>
         <p:spPr>
-          <a:xfrm rot="0">
+          <a:xfrm>
             <a:off x="6816725" y="2564130"/>
-            <a:ext cx="4157345" cy="923925"/>
+            <a:ext cx="4157980" cy="923925"/>
           </a:xfrm>
           <a:prstGeom prst="rect"/>
           <a:noFill/>
@@ -10364,14 +10333,7 @@
                 <a:latin typeface="맑은 고딕" charset="0"/>
                 <a:ea typeface="맑은 고딕" charset="0"/>
               </a:rPr>
-              <a:t>그리고 </a:t>
-            </a:r>
-            <a:r>
-              <a:rPr lang="ko-KR" sz="1800">
-                <a:latin typeface="맑은 고딕" charset="0"/>
-                <a:ea typeface="맑은 고딕" charset="0"/>
-              </a:rPr>
-              <a:t>Volume 오브젝트의 On Value Changed에 VolumeControl( ) 함수를 설정합니다. </a:t>
+              <a:t>그리고 Volume 오브젝트의 On Value Changed에 Volume( ) 함수를 설정합니다. </a:t>
             </a:r>
             <a:endParaRPr lang="ko-KR" altLang="en-US" sz="1800">
               <a:latin typeface="맑은 고딕" charset="0"/>
@@ -10676,6 +10638,37 @@
           <a:xfrm rot="0">
             <a:off x="6816725" y="3624580"/>
             <a:ext cx="4157345" cy="1612900"/>
+          </a:xfrm>
+          <a:prstGeom prst="roundRect"/>
+          <a:solidFill>
+            <a:srgbClr val="EDEDED"/>
+          </a:solidFill>
+        </p:spPr>
+      </p:pic>
+      <p:pic>
+        <p:nvPicPr>
+          <p:cNvPr id="1249" name="그림 1" descr="C:/Users/Admin1/AppData/Roaming/PolarisOffice/ETemp/9796_14990624/fImage674525541.png"/>
+          <p:cNvPicPr>
+            <a:picLocks noChangeAspect="1"/>
+          </p:cNvPicPr>
+          <p:nvPr/>
+        </p:nvPicPr>
+        <p:blipFill rotWithShape="1">
+          <a:blip r:embed="rId9" cstate="print">
+            <a:extLst>
+              <a:ext uri="{28A0092B-C50C-407E-A947-70E740481C1C}">
+                <a14:useLocalDpi xmlns:a14="http://schemas.microsoft.com/office/drawing/2010/main" val="0"/>
+              </a:ext>
+            </a:extLst>
+          </a:blip>
+          <a:stretch>
+            <a:fillRect/>
+          </a:stretch>
+        </p:blipFill>
+        <p:spPr>
+          <a:xfrm rot="0">
+            <a:off x="6816725" y="1235710"/>
+            <a:ext cx="4149090" cy="1184275"/>
           </a:xfrm>
           <a:prstGeom prst="roundRect"/>
           <a:solidFill>

</xml_diff>